<commit_message>
Update 30 & 63.
</commit_message>
<xml_diff>
--- a/63主是力量.pptx
+++ b/63主是力量.pptx
@@ -8,9 +8,11 @@
     <p:sldId id="256" r:id="rId2"/>
     <p:sldId id="257" r:id="rId3"/>
     <p:sldId id="258" r:id="rId4"/>
-    <p:sldId id="259" r:id="rId5"/>
-    <p:sldId id="260" r:id="rId6"/>
-    <p:sldId id="261" r:id="rId7"/>
+    <p:sldId id="262" r:id="rId5"/>
+    <p:sldId id="259" r:id="rId6"/>
+    <p:sldId id="263" r:id="rId7"/>
+    <p:sldId id="260" r:id="rId8"/>
+    <p:sldId id="261" r:id="rId9"/>
   </p:sldIdLst>
   <p:sldSz cx="9144000" cy="5143500" type="screen16x9"/>
   <p:notesSz cx="6858000" cy="9144000"/>
@@ -310,7 +312,7 @@
             <a:fld id="{86B5546F-C09B-4E63-ABC5-F7C86A7E8D66}" type="datetimeFigureOut">
               <a:rPr lang="en-US" smtClean="0"/>
               <a:pPr/>
-              <a:t>7/8/2021</a:t>
+              <a:t>11/25/2021</a:t>
             </a:fld>
             <a:endParaRPr lang="en-US"/>
           </a:p>
@@ -477,7 +479,7 @@
             <a:fld id="{86B5546F-C09B-4E63-ABC5-F7C86A7E8D66}" type="datetimeFigureOut">
               <a:rPr lang="en-US" smtClean="0"/>
               <a:pPr/>
-              <a:t>7/8/2021</a:t>
+              <a:t>11/25/2021</a:t>
             </a:fld>
             <a:endParaRPr lang="en-US"/>
           </a:p>
@@ -654,7 +656,7 @@
             <a:fld id="{86B5546F-C09B-4E63-ABC5-F7C86A7E8D66}" type="datetimeFigureOut">
               <a:rPr lang="en-US" smtClean="0"/>
               <a:pPr/>
-              <a:t>7/8/2021</a:t>
+              <a:t>11/25/2021</a:t>
             </a:fld>
             <a:endParaRPr lang="en-US"/>
           </a:p>
@@ -821,7 +823,7 @@
             <a:fld id="{86B5546F-C09B-4E63-ABC5-F7C86A7E8D66}" type="datetimeFigureOut">
               <a:rPr lang="en-US" smtClean="0"/>
               <a:pPr/>
-              <a:t>7/8/2021</a:t>
+              <a:t>11/25/2021</a:t>
             </a:fld>
             <a:endParaRPr lang="en-US"/>
           </a:p>
@@ -1064,7 +1066,7 @@
             <a:fld id="{86B5546F-C09B-4E63-ABC5-F7C86A7E8D66}" type="datetimeFigureOut">
               <a:rPr lang="en-US" smtClean="0"/>
               <a:pPr/>
-              <a:t>7/8/2021</a:t>
+              <a:t>11/25/2021</a:t>
             </a:fld>
             <a:endParaRPr lang="en-US"/>
           </a:p>
@@ -1349,7 +1351,7 @@
             <a:fld id="{86B5546F-C09B-4E63-ABC5-F7C86A7E8D66}" type="datetimeFigureOut">
               <a:rPr lang="en-US" smtClean="0"/>
               <a:pPr/>
-              <a:t>7/8/2021</a:t>
+              <a:t>11/25/2021</a:t>
             </a:fld>
             <a:endParaRPr lang="en-US"/>
           </a:p>
@@ -1768,7 +1770,7 @@
             <a:fld id="{86B5546F-C09B-4E63-ABC5-F7C86A7E8D66}" type="datetimeFigureOut">
               <a:rPr lang="en-US" smtClean="0"/>
               <a:pPr/>
-              <a:t>7/8/2021</a:t>
+              <a:t>11/25/2021</a:t>
             </a:fld>
             <a:endParaRPr lang="en-US"/>
           </a:p>
@@ -1883,7 +1885,7 @@
             <a:fld id="{86B5546F-C09B-4E63-ABC5-F7C86A7E8D66}" type="datetimeFigureOut">
               <a:rPr lang="en-US" smtClean="0"/>
               <a:pPr/>
-              <a:t>7/8/2021</a:t>
+              <a:t>11/25/2021</a:t>
             </a:fld>
             <a:endParaRPr lang="en-US"/>
           </a:p>
@@ -1975,7 +1977,7 @@
             <a:fld id="{86B5546F-C09B-4E63-ABC5-F7C86A7E8D66}" type="datetimeFigureOut">
               <a:rPr lang="en-US" smtClean="0"/>
               <a:pPr/>
-              <a:t>7/8/2021</a:t>
+              <a:t>11/25/2021</a:t>
             </a:fld>
             <a:endParaRPr lang="en-US"/>
           </a:p>
@@ -2249,7 +2251,7 @@
             <a:fld id="{86B5546F-C09B-4E63-ABC5-F7C86A7E8D66}" type="datetimeFigureOut">
               <a:rPr lang="en-US" smtClean="0"/>
               <a:pPr/>
-              <a:t>7/8/2021</a:t>
+              <a:t>11/25/2021</a:t>
             </a:fld>
             <a:endParaRPr lang="en-US"/>
           </a:p>
@@ -2503,7 +2505,7 @@
             <a:fld id="{86B5546F-C09B-4E63-ABC5-F7C86A7E8D66}" type="datetimeFigureOut">
               <a:rPr lang="en-US" smtClean="0"/>
               <a:pPr/>
-              <a:t>7/8/2021</a:t>
+              <a:t>11/25/2021</a:t>
             </a:fld>
             <a:endParaRPr lang="en-US"/>
           </a:p>
@@ -2718,7 +2720,7 @@
             <a:fld id="{86B5546F-C09B-4E63-ABC5-F7C86A7E8D66}" type="datetimeFigureOut">
               <a:rPr lang="en-US" smtClean="0"/>
               <a:pPr/>
-              <a:t>7/8/2021</a:t>
+              <a:t>11/25/2021</a:t>
             </a:fld>
             <a:endParaRPr lang="en-US"/>
           </a:p>
@@ -3188,17 +3190,17 @@
               <a:t>：</a:t>
             </a:r>
             <a:r>
-              <a:rPr lang="en-US" altLang="zh-CN" b="1" dirty="0">
+              <a:rPr lang="en-US" altLang="zh-CN" b="1" dirty="0" smtClean="0">
                 <a:solidFill>
                   <a:srgbClr val="000066"/>
                 </a:solidFill>
                 <a:latin typeface="微軟正黑體" pitchFamily="34" charset="-120"/>
                 <a:ea typeface="微軟正黑體" pitchFamily="34" charset="-120"/>
               </a:rPr>
-              <a:t>1-8</a:t>
-            </a:r>
-            <a:r>
-              <a:rPr lang="zh-CN" altLang="en-US" b="1" dirty="0">
+              <a:t>1 – 8</a:t>
+            </a:r>
+            <a:r>
+              <a:rPr lang="zh-CN" altLang="en-US" b="1" dirty="0" smtClean="0">
                 <a:solidFill>
                   <a:srgbClr val="000066"/>
                 </a:solidFill>
@@ -3208,14 +3210,14 @@
               <a:t>，</a:t>
             </a:r>
             <a:r>
-              <a:rPr lang="en-US" altLang="zh-CN" b="1" dirty="0">
+              <a:rPr lang="en-US" altLang="zh-CN" b="1" dirty="0" smtClean="0">
                 <a:solidFill>
                   <a:srgbClr val="000066"/>
                 </a:solidFill>
                 <a:latin typeface="微軟正黑體" pitchFamily="34" charset="-120"/>
                 <a:ea typeface="微軟正黑體" pitchFamily="34" charset="-120"/>
               </a:rPr>
-              <a:t>13-14</a:t>
+              <a:t>13 – 14</a:t>
             </a:r>
             <a:endParaRPr lang="en-US" b="1" dirty="0">
               <a:solidFill>
@@ -3376,51 +3378,31 @@
         </p:spPr>
         <p:txBody>
           <a:bodyPr anchor="ctr">
-            <a:normAutofit fontScale="92500" lnSpcReduction="10000"/>
+            <a:normAutofit/>
           </a:bodyPr>
           <a:lstStyle/>
           <a:p>
             <a:r>
-              <a:rPr lang="zh-TW" altLang="en-US" sz="5200" dirty="0">
+              <a:rPr lang="zh-TW" altLang="en-US" sz="4800" dirty="0">
                 <a:solidFill>
                   <a:srgbClr val="000066"/>
                 </a:solidFill>
                 <a:latin typeface="Microsoft JhengHei" pitchFamily="34" charset="-120"/>
                 <a:ea typeface="Microsoft JhengHei" pitchFamily="34" charset="-120"/>
               </a:rPr>
-              <a:t>雖有軍兵安營攻擊我，我的心也不害怕；雖然興起刀兵攻擊我，我必仍舊安穩。</a:t>
-            </a:r>
-            <a:r>
-              <a:rPr lang="en-US" altLang="zh-TW" sz="5400" dirty="0" smtClean="0">
-                <a:solidFill>
-                  <a:srgbClr val="000066"/>
-                </a:solidFill>
-              </a:rPr>
-              <a:t> </a:t>
-            </a:r>
-          </a:p>
-          <a:p>
-            <a:r>
-              <a:rPr lang="zh-TW" altLang="en-US" sz="5200" b="1" dirty="0" smtClean="0">
+              <a:t>雖有軍兵安營攻擊我，我的心也不害怕；雖然興起刀兵攻擊我，我必仍舊安穩</a:t>
+            </a:r>
+            <a:r>
+              <a:rPr lang="zh-TW" altLang="en-US" sz="4800" dirty="0" smtClean="0">
                 <a:solidFill>
                   <a:srgbClr val="000066"/>
                 </a:solidFill>
                 <a:latin typeface="Microsoft JhengHei" pitchFamily="34" charset="-120"/>
                 <a:ea typeface="Microsoft JhengHei" pitchFamily="34" charset="-120"/>
               </a:rPr>
-              <a:t>有一件事，我曾求耶和華，我仍要尋求：就是一生一世住在耶和華的殿中，瞻仰他的榮美，在他的殿裡求問。</a:t>
-            </a:r>
-            <a:r>
-              <a:rPr lang="en-US" altLang="zh-TW" sz="5200" b="1" dirty="0" smtClean="0">
-                <a:solidFill>
-                  <a:srgbClr val="000066"/>
-                </a:solidFill>
-                <a:latin typeface="Microsoft JhengHei" pitchFamily="34" charset="-120"/>
-                <a:ea typeface="Microsoft JhengHei" pitchFamily="34" charset="-120"/>
-              </a:rPr>
-              <a:t> </a:t>
-            </a:r>
-            <a:endParaRPr lang="en-US" altLang="zh-TW" sz="5200" b="1" dirty="0">
+              <a:t>。</a:t>
+            </a:r>
+            <a:endParaRPr lang="en-US" altLang="zh-TW" sz="4800" b="1" dirty="0">
               <a:solidFill>
                 <a:srgbClr val="000066"/>
               </a:solidFill>
@@ -3475,27 +3457,37 @@
         <p:spPr>
           <a:xfrm>
             <a:off x="0" y="0"/>
-            <a:ext cx="8991600" cy="5143500"/>
+            <a:ext cx="9144000" cy="5143500"/>
           </a:xfrm>
         </p:spPr>
         <p:txBody>
           <a:bodyPr anchor="ctr">
-            <a:normAutofit lnSpcReduction="10000"/>
+            <a:normAutofit/>
           </a:bodyPr>
           <a:lstStyle/>
           <a:p>
             <a:r>
-              <a:rPr lang="zh-TW" altLang="en-US" sz="4800" dirty="0">
+              <a:rPr lang="zh-TW" altLang="en-US" sz="4800" b="1" dirty="0" smtClean="0">
                 <a:solidFill>
                   <a:srgbClr val="000066"/>
                 </a:solidFill>
                 <a:latin typeface="Microsoft JhengHei" pitchFamily="34" charset="-120"/>
                 <a:ea typeface="Microsoft JhengHei" pitchFamily="34" charset="-120"/>
               </a:rPr>
-              <a:t>因為我遭遇患難，他必暗暗的保守我；在他亭子裡，把我藏在他帳幕的隱密處，將我高舉在磐石上。</a:t>
-            </a:r>
-            <a:r>
-              <a:rPr lang="en-US" altLang="zh-TW" sz="4800" dirty="0">
+              <a:t>有</a:t>
+            </a:r>
+            <a:r>
+              <a:rPr lang="zh-TW" altLang="en-US" sz="4800" b="1" dirty="0" smtClean="0">
+                <a:solidFill>
+                  <a:srgbClr val="000066"/>
+                </a:solidFill>
+                <a:latin typeface="Microsoft JhengHei" pitchFamily="34" charset="-120"/>
+                <a:ea typeface="Microsoft JhengHei" pitchFamily="34" charset="-120"/>
+              </a:rPr>
+              <a:t>一件事，我曾求耶和華，我仍要尋求：就是一生一世住在耶和華的殿中，瞻仰他的榮美，在他的殿裡求問。</a:t>
+            </a:r>
+            <a:r>
+              <a:rPr lang="en-US" altLang="zh-TW" sz="4800" b="1" dirty="0" smtClean="0">
                 <a:solidFill>
                   <a:srgbClr val="000066"/>
                 </a:solidFill>
@@ -3504,7 +3496,7 @@
               </a:rPr>
               <a:t> </a:t>
             </a:r>
-            <a:endParaRPr lang="en-US" altLang="zh-TW" sz="4800" dirty="0" smtClean="0">
+            <a:endParaRPr lang="en-US" altLang="zh-TW" sz="4800" b="1" dirty="0">
               <a:solidFill>
                 <a:srgbClr val="000066"/>
               </a:solidFill>
@@ -3512,29 +3504,14 @@
               <a:ea typeface="Microsoft JhengHei" pitchFamily="34" charset="-120"/>
             </a:endParaRPr>
           </a:p>
-          <a:p>
-            <a:r>
-              <a:rPr lang="zh-TW" altLang="en-US" sz="4800" b="1" dirty="0">
-                <a:solidFill>
-                  <a:srgbClr val="000066"/>
-                </a:solidFill>
-                <a:latin typeface="Microsoft JhengHei" pitchFamily="34" charset="-120"/>
-                <a:ea typeface="Microsoft JhengHei" pitchFamily="34" charset="-120"/>
-              </a:rPr>
-              <a:t>現在我得以昂首，高過四面的仇敵。我要在他的帳幕裡歡然獻祭；我要唱詩歌頌耶和華。</a:t>
-            </a:r>
-            <a:r>
-              <a:rPr lang="en-US" altLang="zh-TW" sz="4800" b="1" dirty="0">
-                <a:solidFill>
-                  <a:srgbClr val="000066"/>
-                </a:solidFill>
-              </a:rPr>
-              <a:t> </a:t>
-            </a:r>
-          </a:p>
         </p:txBody>
       </p:sp>
     </p:spTree>
+    <p:extLst>
+      <p:ext uri="{BB962C8B-B14F-4D97-AF65-F5344CB8AC3E}">
+        <p14:creationId xmlns:p14="http://schemas.microsoft.com/office/powerpoint/2010/main" val="2981052515"/>
+      </p:ext>
+    </p:extLst>
   </p:cSld>
   <p:clrMapOvr>
     <a:masterClrMapping/>
@@ -3596,36 +3573,23 @@
                 <a:latin typeface="Microsoft JhengHei" pitchFamily="34" charset="-120"/>
                 <a:ea typeface="Microsoft JhengHei" pitchFamily="34" charset="-120"/>
               </a:rPr>
-              <a:t>耶和華啊，我用聲音呼籲的時候，求你垂聽；並求你憐恤我，應允我。</a:t>
-            </a:r>
-            <a:r>
-              <a:rPr lang="en-US" altLang="zh-TW" sz="5400" dirty="0" smtClean="0">
-                <a:solidFill>
-                  <a:srgbClr val="000066"/>
-                </a:solidFill>
-              </a:rPr>
-              <a:t> </a:t>
-            </a:r>
-          </a:p>
-          <a:p>
-            <a:r>
-              <a:rPr lang="zh-TW" altLang="en-US" sz="4800" b="1" dirty="0">
+              <a:t>因為我遭遇患難，他必暗暗的保守我；在他亭子裡，把我藏在他帳幕的隱密處，將我高舉在磐石上</a:t>
+            </a:r>
+            <a:r>
+              <a:rPr lang="zh-TW" altLang="en-US" sz="4800" dirty="0" smtClean="0">
                 <a:solidFill>
                   <a:srgbClr val="000066"/>
                 </a:solidFill>
                 <a:latin typeface="Microsoft JhengHei" pitchFamily="34" charset="-120"/>
                 <a:ea typeface="Microsoft JhengHei" pitchFamily="34" charset="-120"/>
               </a:rPr>
-              <a:t>你說：你們當尋求我的面。那時我心向你說：耶和華啊，你的面我正要尋求。</a:t>
-            </a:r>
-            <a:r>
-              <a:rPr lang="en-US" altLang="zh-TW" sz="5400" b="1" dirty="0" smtClean="0">
-                <a:solidFill>
-                  <a:srgbClr val="000066"/>
-                </a:solidFill>
-              </a:rPr>
-              <a:t> </a:t>
-            </a:r>
+              <a:t>。</a:t>
+            </a:r>
+            <a:endParaRPr lang="en-US" altLang="zh-TW" sz="4800" b="1" dirty="0">
+              <a:solidFill>
+                <a:srgbClr val="000066"/>
+              </a:solidFill>
+            </a:endParaRPr>
           </a:p>
         </p:txBody>
       </p:sp>
@@ -3645,6 +3609,191 @@
 </file>
 
 <file path=ppt/slides/slide6.xml><?xml version="1.0" encoding="utf-8"?>
+<p:sld xmlns:a="http://schemas.openxmlformats.org/drawingml/2006/main" xmlns:r="http://schemas.openxmlformats.org/officeDocument/2006/relationships" xmlns:p="http://schemas.openxmlformats.org/presentationml/2006/main">
+  <p:cSld>
+    <p:spTree>
+      <p:nvGrpSpPr>
+        <p:cNvPr id="1" name=""/>
+        <p:cNvGrpSpPr/>
+        <p:nvPr/>
+      </p:nvGrpSpPr>
+      <p:grpSpPr>
+        <a:xfrm>
+          <a:off x="0" y="0"/>
+          <a:ext cx="0" cy="0"/>
+          <a:chOff x="0" y="0"/>
+          <a:chExt cx="0" cy="0"/>
+        </a:xfrm>
+      </p:grpSpPr>
+      <p:sp>
+        <p:nvSpPr>
+          <p:cNvPr id="3" name="Content Placeholder 2"/>
+          <p:cNvSpPr>
+            <a:spLocks noGrp="1"/>
+          </p:cNvSpPr>
+          <p:nvPr>
+            <p:ph idx="1"/>
+          </p:nvPr>
+        </p:nvSpPr>
+        <p:spPr>
+          <a:xfrm>
+            <a:off x="0" y="0"/>
+            <a:ext cx="8991600" cy="5143500"/>
+          </a:xfrm>
+        </p:spPr>
+        <p:txBody>
+          <a:bodyPr anchor="ctr">
+            <a:normAutofit/>
+          </a:bodyPr>
+          <a:lstStyle/>
+          <a:p>
+            <a:r>
+              <a:rPr lang="zh-TW" altLang="en-US" sz="4800" b="1" dirty="0" smtClean="0">
+                <a:solidFill>
+                  <a:srgbClr val="000066"/>
+                </a:solidFill>
+                <a:latin typeface="Microsoft JhengHei" pitchFamily="34" charset="-120"/>
+                <a:ea typeface="Microsoft JhengHei" pitchFamily="34" charset="-120"/>
+              </a:rPr>
+              <a:t>現</a:t>
+            </a:r>
+            <a:r>
+              <a:rPr lang="zh-TW" altLang="en-US" sz="4800" b="1" dirty="0">
+                <a:solidFill>
+                  <a:srgbClr val="000066"/>
+                </a:solidFill>
+                <a:latin typeface="Microsoft JhengHei" pitchFamily="34" charset="-120"/>
+                <a:ea typeface="Microsoft JhengHei" pitchFamily="34" charset="-120"/>
+              </a:rPr>
+              <a:t>在我得以昂首，高過四面的仇敵。我要在他的帳幕裡歡然獻祭；我要唱詩歌頌耶和華。</a:t>
+            </a:r>
+            <a:r>
+              <a:rPr lang="en-US" altLang="zh-TW" sz="4800" b="1" dirty="0">
+                <a:solidFill>
+                  <a:srgbClr val="000066"/>
+                </a:solidFill>
+              </a:rPr>
+              <a:t> </a:t>
+            </a:r>
+          </a:p>
+        </p:txBody>
+      </p:sp>
+    </p:spTree>
+    <p:extLst>
+      <p:ext uri="{BB962C8B-B14F-4D97-AF65-F5344CB8AC3E}">
+        <p14:creationId xmlns:p14="http://schemas.microsoft.com/office/powerpoint/2010/main" val="3756346768"/>
+      </p:ext>
+    </p:extLst>
+  </p:cSld>
+  <p:clrMapOvr>
+    <a:masterClrMapping/>
+  </p:clrMapOvr>
+  <p:timing>
+    <p:tnLst>
+      <p:par>
+        <p:cTn id="1" dur="indefinite" restart="never" nodeType="tmRoot"/>
+      </p:par>
+    </p:tnLst>
+  </p:timing>
+</p:sld>
+</file>
+
+<file path=ppt/slides/slide7.xml><?xml version="1.0" encoding="utf-8"?>
+<p:sld xmlns:a="http://schemas.openxmlformats.org/drawingml/2006/main" xmlns:r="http://schemas.openxmlformats.org/officeDocument/2006/relationships" xmlns:p="http://schemas.openxmlformats.org/presentationml/2006/main">
+  <p:cSld>
+    <p:spTree>
+      <p:nvGrpSpPr>
+        <p:cNvPr id="1" name=""/>
+        <p:cNvGrpSpPr/>
+        <p:nvPr/>
+      </p:nvGrpSpPr>
+      <p:grpSpPr>
+        <a:xfrm>
+          <a:off x="0" y="0"/>
+          <a:ext cx="0" cy="0"/>
+          <a:chOff x="0" y="0"/>
+          <a:chExt cx="0" cy="0"/>
+        </a:xfrm>
+      </p:grpSpPr>
+      <p:sp>
+        <p:nvSpPr>
+          <p:cNvPr id="3" name="Content Placeholder 2"/>
+          <p:cNvSpPr>
+            <a:spLocks noGrp="1"/>
+          </p:cNvSpPr>
+          <p:nvPr>
+            <p:ph idx="1"/>
+          </p:nvPr>
+        </p:nvSpPr>
+        <p:spPr>
+          <a:xfrm>
+            <a:off x="0" y="0"/>
+            <a:ext cx="8991600" cy="5143500"/>
+          </a:xfrm>
+        </p:spPr>
+        <p:txBody>
+          <a:bodyPr anchor="ctr">
+            <a:normAutofit/>
+          </a:bodyPr>
+          <a:lstStyle/>
+          <a:p>
+            <a:r>
+              <a:rPr lang="zh-TW" altLang="en-US" sz="4800" dirty="0">
+                <a:solidFill>
+                  <a:srgbClr val="000066"/>
+                </a:solidFill>
+                <a:latin typeface="Microsoft JhengHei" pitchFamily="34" charset="-120"/>
+                <a:ea typeface="Microsoft JhengHei" pitchFamily="34" charset="-120"/>
+              </a:rPr>
+              <a:t>耶和華啊，我用聲音呼籲的時候，求你垂聽；並求你憐恤我，應允我。</a:t>
+            </a:r>
+            <a:r>
+              <a:rPr lang="en-US" altLang="zh-TW" sz="5400" dirty="0" smtClean="0">
+                <a:solidFill>
+                  <a:srgbClr val="000066"/>
+                </a:solidFill>
+              </a:rPr>
+              <a:t> </a:t>
+            </a:r>
+          </a:p>
+          <a:p>
+            <a:r>
+              <a:rPr lang="zh-TW" altLang="en-US" sz="4800" b="1" dirty="0">
+                <a:solidFill>
+                  <a:srgbClr val="000066"/>
+                </a:solidFill>
+                <a:latin typeface="Microsoft JhengHei" pitchFamily="34" charset="-120"/>
+                <a:ea typeface="Microsoft JhengHei" pitchFamily="34" charset="-120"/>
+              </a:rPr>
+              <a:t>你說：你們當尋求我的面。那時我心向你說：耶和華啊，你的面我正要尋求。</a:t>
+            </a:r>
+            <a:r>
+              <a:rPr lang="en-US" altLang="zh-TW" sz="5400" b="1" dirty="0" smtClean="0">
+                <a:solidFill>
+                  <a:srgbClr val="000066"/>
+                </a:solidFill>
+              </a:rPr>
+              <a:t> </a:t>
+            </a:r>
+          </a:p>
+        </p:txBody>
+      </p:sp>
+    </p:spTree>
+  </p:cSld>
+  <p:clrMapOvr>
+    <a:masterClrMapping/>
+  </p:clrMapOvr>
+  <p:timing>
+    <p:tnLst>
+      <p:par>
+        <p:cTn id="1" dur="indefinite" restart="never" nodeType="tmRoot"/>
+      </p:par>
+    </p:tnLst>
+  </p:timing>
+</p:sld>
+</file>
+
+<file path=ppt/slides/slide8.xml><?xml version="1.0" encoding="utf-8"?>
 <p:sld xmlns:a="http://schemas.openxmlformats.org/drawingml/2006/main" xmlns:r="http://schemas.openxmlformats.org/officeDocument/2006/relationships" xmlns:p="http://schemas.openxmlformats.org/presentationml/2006/main">
   <p:cSld>
     <p:spTree>

</xml_diff>